<commit_message>
Updated tags logic. Updated scaling config
</commit_message>
<xml_diff>
--- a/docs/AWS Architecture.pptx
+++ b/docs/AWS Architecture.pptx
@@ -7,6 +7,7 @@
   <p:sldIdLst>
     <p:sldId id="256" r:id="rId2"/>
     <p:sldId id="257" r:id="rId3"/>
+    <p:sldId id="258" r:id="rId4"/>
   </p:sldIdLst>
   <p:sldSz cx="12192000" cy="6858000"/>
   <p:notesSz cx="6858000" cy="9144000"/>
@@ -7273,6 +7274,1608 @@
 </p:sld>
 </file>
 
+<file path=ppt/slides/slide3.xml><?xml version="1.0" encoding="utf-8"?>
+<p:sld xmlns:a="http://schemas.openxmlformats.org/drawingml/2006/main" xmlns:r="http://schemas.openxmlformats.org/officeDocument/2006/relationships" xmlns:p="http://schemas.openxmlformats.org/presentationml/2006/main">
+  <p:cSld>
+    <p:spTree>
+      <p:nvGrpSpPr>
+        <p:cNvPr id="1" name=""/>
+        <p:cNvGrpSpPr/>
+        <p:nvPr/>
+      </p:nvGrpSpPr>
+      <p:grpSpPr>
+        <a:xfrm>
+          <a:off x="0" y="0"/>
+          <a:ext cx="0" cy="0"/>
+          <a:chOff x="0" y="0"/>
+          <a:chExt cx="0" cy="0"/>
+        </a:xfrm>
+      </p:grpSpPr>
+      <p:grpSp>
+        <p:nvGrpSpPr>
+          <p:cNvPr id="11" name="Group 10">
+            <a:extLst>
+              <a:ext uri="{FF2B5EF4-FFF2-40B4-BE49-F238E27FC236}">
+                <a16:creationId xmlns:a16="http://schemas.microsoft.com/office/drawing/2014/main" id="{2D2CF957-711A-680D-9988-E49DB528B75A}"/>
+              </a:ext>
+            </a:extLst>
+          </p:cNvPr>
+          <p:cNvGrpSpPr/>
+          <p:nvPr/>
+        </p:nvGrpSpPr>
+        <p:grpSpPr>
+          <a:xfrm>
+            <a:off x="236353" y="238866"/>
+            <a:ext cx="11719294" cy="6096488"/>
+            <a:chOff x="236353" y="238866"/>
+            <a:chExt cx="11719294" cy="6096488"/>
+          </a:xfrm>
+        </p:grpSpPr>
+        <p:sp>
+          <p:nvSpPr>
+            <p:cNvPr id="5" name="Rectangle 4">
+              <a:extLst>
+                <a:ext uri="{FF2B5EF4-FFF2-40B4-BE49-F238E27FC236}">
+                  <a16:creationId xmlns:a16="http://schemas.microsoft.com/office/drawing/2014/main" id="{A1C33B23-4112-9CF0-04B5-D83AFF771ACD}"/>
+                </a:ext>
+              </a:extLst>
+            </p:cNvPr>
+            <p:cNvSpPr/>
+            <p:nvPr/>
+          </p:nvSpPr>
+          <p:spPr>
+            <a:xfrm>
+              <a:off x="304800" y="470817"/>
+              <a:ext cx="11650847" cy="5864537"/>
+            </a:xfrm>
+            <a:prstGeom prst="rect">
+              <a:avLst/>
+            </a:prstGeom>
+            <a:noFill/>
+            <a:ln w="3175">
+              <a:solidFill>
+                <a:schemeClr val="tx1"/>
+              </a:solidFill>
+              <a:prstDash val="dash"/>
+            </a:ln>
+          </p:spPr>
+          <p:style>
+            <a:lnRef idx="2">
+              <a:schemeClr val="dk1"/>
+            </a:lnRef>
+            <a:fillRef idx="1">
+              <a:schemeClr val="lt1"/>
+            </a:fillRef>
+            <a:effectRef idx="0">
+              <a:schemeClr val="dk1"/>
+            </a:effectRef>
+            <a:fontRef idx="minor">
+              <a:schemeClr val="dk1"/>
+            </a:fontRef>
+          </p:style>
+          <p:txBody>
+            <a:bodyPr rtlCol="0" anchor="ctr"/>
+            <a:lstStyle/>
+            <a:p>
+              <a:pPr algn="ctr"/>
+              <a:endParaRPr lang="en-US" dirty="0"/>
+            </a:p>
+          </p:txBody>
+        </p:sp>
+        <p:sp>
+          <p:nvSpPr>
+            <p:cNvPr id="10" name="TextBox 9">
+              <a:extLst>
+                <a:ext uri="{FF2B5EF4-FFF2-40B4-BE49-F238E27FC236}">
+                  <a16:creationId xmlns:a16="http://schemas.microsoft.com/office/drawing/2014/main" id="{5A84DC3F-7345-EA6E-526B-4BFD5CEA0D50}"/>
+                </a:ext>
+              </a:extLst>
+            </p:cNvPr>
+            <p:cNvSpPr txBox="1"/>
+            <p:nvPr/>
+          </p:nvSpPr>
+          <p:spPr>
+            <a:xfrm>
+              <a:off x="236353" y="238866"/>
+              <a:ext cx="835485" cy="246221"/>
+            </a:xfrm>
+            <a:prstGeom prst="rect">
+              <a:avLst/>
+            </a:prstGeom>
+            <a:noFill/>
+          </p:spPr>
+          <p:txBody>
+            <a:bodyPr wrap="none" rtlCol="0">
+              <a:spAutoFit/>
+            </a:bodyPr>
+            <a:lstStyle/>
+            <a:p>
+              <a:r>
+                <a:rPr lang="en-US" sz="1000" b="1" dirty="0"/>
+                <a:t>AWS Region</a:t>
+              </a:r>
+            </a:p>
+          </p:txBody>
+        </p:sp>
+        <p:sp>
+          <p:nvSpPr>
+            <p:cNvPr id="16" name="TextBox 15">
+              <a:extLst>
+                <a:ext uri="{FF2B5EF4-FFF2-40B4-BE49-F238E27FC236}">
+                  <a16:creationId xmlns:a16="http://schemas.microsoft.com/office/drawing/2014/main" id="{1335B68F-AD75-A276-2545-158C752C22CD}"/>
+                </a:ext>
+              </a:extLst>
+            </p:cNvPr>
+            <p:cNvSpPr txBox="1"/>
+            <p:nvPr/>
+          </p:nvSpPr>
+          <p:spPr>
+            <a:xfrm>
+              <a:off x="2811957" y="868549"/>
+              <a:ext cx="1236236" cy="246221"/>
+            </a:xfrm>
+            <a:prstGeom prst="rect">
+              <a:avLst/>
+            </a:prstGeom>
+            <a:noFill/>
+          </p:spPr>
+          <p:txBody>
+            <a:bodyPr wrap="none" rtlCol="0">
+              <a:spAutoFit/>
+            </a:bodyPr>
+            <a:lstStyle/>
+            <a:p>
+              <a:r>
+                <a:rPr lang="en-US" sz="1000" b="1" dirty="0"/>
+                <a:t>Availability Zone - 1</a:t>
+              </a:r>
+            </a:p>
+          </p:txBody>
+        </p:sp>
+        <p:sp>
+          <p:nvSpPr>
+            <p:cNvPr id="17" name="TextBox 16">
+              <a:extLst>
+                <a:ext uri="{FF2B5EF4-FFF2-40B4-BE49-F238E27FC236}">
+                  <a16:creationId xmlns:a16="http://schemas.microsoft.com/office/drawing/2014/main" id="{6D7C0308-FE6A-E0DF-CBAF-FA5D8133D020}"/>
+                </a:ext>
+              </a:extLst>
+            </p:cNvPr>
+            <p:cNvSpPr txBox="1"/>
+            <p:nvPr/>
+          </p:nvSpPr>
+          <p:spPr>
+            <a:xfrm>
+              <a:off x="8301764" y="815020"/>
+              <a:ext cx="1236236" cy="246221"/>
+            </a:xfrm>
+            <a:prstGeom prst="rect">
+              <a:avLst/>
+            </a:prstGeom>
+            <a:noFill/>
+          </p:spPr>
+          <p:txBody>
+            <a:bodyPr wrap="none" rtlCol="0">
+              <a:spAutoFit/>
+            </a:bodyPr>
+            <a:lstStyle/>
+            <a:p>
+              <a:r>
+                <a:rPr lang="en-US" sz="1000" b="1" dirty="0"/>
+                <a:t>Availability Zone - 2</a:t>
+              </a:r>
+            </a:p>
+          </p:txBody>
+        </p:sp>
+      </p:grpSp>
+      <p:grpSp>
+        <p:nvGrpSpPr>
+          <p:cNvPr id="13" name="Group 12">
+            <a:extLst>
+              <a:ext uri="{FF2B5EF4-FFF2-40B4-BE49-F238E27FC236}">
+                <a16:creationId xmlns:a16="http://schemas.microsoft.com/office/drawing/2014/main" id="{C987AACE-F126-7E1C-0B8E-AA4B0D6DB937}"/>
+              </a:ext>
+            </a:extLst>
+          </p:cNvPr>
+          <p:cNvGrpSpPr/>
+          <p:nvPr/>
+        </p:nvGrpSpPr>
+        <p:grpSpPr>
+          <a:xfrm>
+            <a:off x="326001" y="609041"/>
+            <a:ext cx="11417764" cy="5549712"/>
+            <a:chOff x="326001" y="609041"/>
+            <a:chExt cx="11417764" cy="5549712"/>
+          </a:xfrm>
+        </p:grpSpPr>
+        <p:sp>
+          <p:nvSpPr>
+            <p:cNvPr id="8" name="Rectangle 7">
+              <a:extLst>
+                <a:ext uri="{FF2B5EF4-FFF2-40B4-BE49-F238E27FC236}">
+                  <a16:creationId xmlns:a16="http://schemas.microsoft.com/office/drawing/2014/main" id="{B18302E6-4626-B4FF-B933-ECEDD7E8E21B}"/>
+                </a:ext>
+              </a:extLst>
+            </p:cNvPr>
+            <p:cNvSpPr/>
+            <p:nvPr/>
+          </p:nvSpPr>
+          <p:spPr>
+            <a:xfrm>
+              <a:off x="537883" y="745577"/>
+              <a:ext cx="11205882" cy="5413176"/>
+            </a:xfrm>
+            <a:prstGeom prst="rect">
+              <a:avLst/>
+            </a:prstGeom>
+            <a:noFill/>
+            <a:ln>
+              <a:solidFill>
+                <a:schemeClr val="accent6"/>
+              </a:solidFill>
+              <a:prstDash val="dash"/>
+            </a:ln>
+          </p:spPr>
+          <p:style>
+            <a:lnRef idx="2">
+              <a:schemeClr val="dk1"/>
+            </a:lnRef>
+            <a:fillRef idx="1">
+              <a:schemeClr val="lt1"/>
+            </a:fillRef>
+            <a:effectRef idx="0">
+              <a:schemeClr val="dk1"/>
+            </a:effectRef>
+            <a:fontRef idx="minor">
+              <a:schemeClr val="dk1"/>
+            </a:fontRef>
+          </p:style>
+          <p:txBody>
+            <a:bodyPr rtlCol="0" anchor="ctr"/>
+            <a:lstStyle/>
+            <a:p>
+              <a:pPr algn="ctr"/>
+              <a:endParaRPr lang="en-US" dirty="0"/>
+            </a:p>
+          </p:txBody>
+        </p:sp>
+        <p:pic>
+          <p:nvPicPr>
+            <p:cNvPr id="1026" name="Picture 2" descr="AWS VPC icon PNG and SVG Vector Free Download">
+              <a:extLst>
+                <a:ext uri="{FF2B5EF4-FFF2-40B4-BE49-F238E27FC236}">
+                  <a16:creationId xmlns:a16="http://schemas.microsoft.com/office/drawing/2014/main" id="{D2E5DB50-7504-A2C6-1EA3-37D70A475C4E}"/>
+                </a:ext>
+              </a:extLst>
+            </p:cNvPr>
+            <p:cNvPicPr>
+              <a:picLocks noChangeAspect="1" noChangeArrowheads="1"/>
+            </p:cNvPicPr>
+            <p:nvPr/>
+          </p:nvPicPr>
+          <p:blipFill>
+            <a:blip r:embed="rId2">
+              <a:extLst>
+                <a:ext uri="{28A0092B-C50C-407E-A947-70E740481C1C}">
+                  <a14:useLocalDpi xmlns:a14="http://schemas.microsoft.com/office/drawing/2010/main" val="0"/>
+                </a:ext>
+              </a:extLst>
+            </a:blip>
+            <a:srcRect/>
+            <a:stretch>
+              <a:fillRect/>
+            </a:stretch>
+          </p:blipFill>
+          <p:spPr bwMode="auto">
+            <a:xfrm>
+              <a:off x="326001" y="609041"/>
+              <a:ext cx="438150" cy="273072"/>
+            </a:xfrm>
+            <a:prstGeom prst="rect">
+              <a:avLst/>
+            </a:prstGeom>
+            <a:noFill/>
+            <a:extLst>
+              <a:ext uri="{909E8E84-426E-40DD-AFC4-6F175D3DCCD1}">
+                <a14:hiddenFill xmlns:a14="http://schemas.microsoft.com/office/drawing/2010/main">
+                  <a:solidFill>
+                    <a:srgbClr val="FFFFFF"/>
+                  </a:solidFill>
+                </a14:hiddenFill>
+              </a:ext>
+            </a:extLst>
+          </p:spPr>
+        </p:pic>
+      </p:grpSp>
+      <p:sp>
+        <p:nvSpPr>
+          <p:cNvPr id="14" name="Rectangle: Rounded Corners 13">
+            <a:extLst>
+              <a:ext uri="{FF2B5EF4-FFF2-40B4-BE49-F238E27FC236}">
+                <a16:creationId xmlns:a16="http://schemas.microsoft.com/office/drawing/2014/main" id="{BBAE8C96-1DD9-74CF-74FF-1AEE43B0B44A}"/>
+              </a:ext>
+            </a:extLst>
+          </p:cNvPr>
+          <p:cNvSpPr/>
+          <p:nvPr/>
+        </p:nvSpPr>
+        <p:spPr>
+          <a:xfrm>
+            <a:off x="764152" y="1120588"/>
+            <a:ext cx="4865684" cy="4796118"/>
+          </a:xfrm>
+          <a:prstGeom prst="roundRect">
+            <a:avLst>
+              <a:gd name="adj" fmla="val 4144"/>
+            </a:avLst>
+          </a:prstGeom>
+          <a:noFill/>
+          <a:ln>
+            <a:solidFill>
+              <a:schemeClr val="accent2"/>
+            </a:solidFill>
+            <a:prstDash val="dashDot"/>
+          </a:ln>
+        </p:spPr>
+        <p:style>
+          <a:lnRef idx="2">
+            <a:schemeClr val="accent1">
+              <a:shade val="15000"/>
+            </a:schemeClr>
+          </a:lnRef>
+          <a:fillRef idx="1">
+            <a:schemeClr val="accent1"/>
+          </a:fillRef>
+          <a:effectRef idx="0">
+            <a:schemeClr val="accent1"/>
+          </a:effectRef>
+          <a:fontRef idx="minor">
+            <a:schemeClr val="lt1"/>
+          </a:fontRef>
+        </p:style>
+        <p:txBody>
+          <a:bodyPr rtlCol="0" anchor="ctr"/>
+          <a:lstStyle/>
+          <a:p>
+            <a:pPr algn="ctr"/>
+            <a:endParaRPr lang="en-US"/>
+          </a:p>
+        </p:txBody>
+      </p:sp>
+      <p:sp>
+        <p:nvSpPr>
+          <p:cNvPr id="15" name="Rectangle: Rounded Corners 14">
+            <a:extLst>
+              <a:ext uri="{FF2B5EF4-FFF2-40B4-BE49-F238E27FC236}">
+                <a16:creationId xmlns:a16="http://schemas.microsoft.com/office/drawing/2014/main" id="{0EDEDC4F-0C09-B383-1E87-9234CAB2EB2F}"/>
+              </a:ext>
+            </a:extLst>
+          </p:cNvPr>
+          <p:cNvSpPr/>
+          <p:nvPr/>
+        </p:nvSpPr>
+        <p:spPr>
+          <a:xfrm>
+            <a:off x="6562166" y="1114770"/>
+            <a:ext cx="5023641" cy="4796118"/>
+          </a:xfrm>
+          <a:prstGeom prst="roundRect">
+            <a:avLst>
+              <a:gd name="adj" fmla="val 4891"/>
+            </a:avLst>
+          </a:prstGeom>
+          <a:noFill/>
+          <a:ln>
+            <a:solidFill>
+              <a:schemeClr val="accent2"/>
+            </a:solidFill>
+            <a:prstDash val="dashDot"/>
+          </a:ln>
+        </p:spPr>
+        <p:style>
+          <a:lnRef idx="2">
+            <a:schemeClr val="accent1">
+              <a:shade val="15000"/>
+            </a:schemeClr>
+          </a:lnRef>
+          <a:fillRef idx="1">
+            <a:schemeClr val="accent1"/>
+          </a:fillRef>
+          <a:effectRef idx="0">
+            <a:schemeClr val="accent1"/>
+          </a:effectRef>
+          <a:fontRef idx="minor">
+            <a:schemeClr val="lt1"/>
+          </a:fontRef>
+        </p:style>
+        <p:txBody>
+          <a:bodyPr rtlCol="0" anchor="ctr"/>
+          <a:lstStyle/>
+          <a:p>
+            <a:pPr algn="ctr"/>
+            <a:endParaRPr lang="en-US"/>
+          </a:p>
+        </p:txBody>
+      </p:sp>
+      <p:grpSp>
+        <p:nvGrpSpPr>
+          <p:cNvPr id="31" name="Group 30">
+            <a:extLst>
+              <a:ext uri="{FF2B5EF4-FFF2-40B4-BE49-F238E27FC236}">
+                <a16:creationId xmlns:a16="http://schemas.microsoft.com/office/drawing/2014/main" id="{DED8F53E-D549-F4A4-780E-44FAFF934B57}"/>
+              </a:ext>
+            </a:extLst>
+          </p:cNvPr>
+          <p:cNvGrpSpPr/>
+          <p:nvPr/>
+        </p:nvGrpSpPr>
+        <p:grpSpPr>
+          <a:xfrm>
+            <a:off x="6705600" y="1256757"/>
+            <a:ext cx="4805531" cy="1380566"/>
+            <a:chOff x="6261124" y="1220897"/>
+            <a:chExt cx="5250007" cy="1380566"/>
+          </a:xfrm>
+        </p:grpSpPr>
+        <p:sp>
+          <p:nvSpPr>
+            <p:cNvPr id="20" name="Rectangle 19">
+              <a:extLst>
+                <a:ext uri="{FF2B5EF4-FFF2-40B4-BE49-F238E27FC236}">
+                  <a16:creationId xmlns:a16="http://schemas.microsoft.com/office/drawing/2014/main" id="{B26F6F89-8A2F-32AC-E51A-2362731EB671}"/>
+                </a:ext>
+              </a:extLst>
+            </p:cNvPr>
+            <p:cNvSpPr/>
+            <p:nvPr/>
+          </p:nvSpPr>
+          <p:spPr>
+            <a:xfrm>
+              <a:off x="6307882" y="1220897"/>
+              <a:ext cx="5203249" cy="1380566"/>
+            </a:xfrm>
+            <a:prstGeom prst="rect">
+              <a:avLst/>
+            </a:prstGeom>
+            <a:solidFill>
+              <a:srgbClr val="EEF7E9"/>
+            </a:solidFill>
+            <a:ln>
+              <a:noFill/>
+            </a:ln>
+          </p:spPr>
+          <p:style>
+            <a:lnRef idx="2">
+              <a:schemeClr val="accent1">
+                <a:shade val="15000"/>
+              </a:schemeClr>
+            </a:lnRef>
+            <a:fillRef idx="1">
+              <a:schemeClr val="accent1"/>
+            </a:fillRef>
+            <a:effectRef idx="0">
+              <a:schemeClr val="accent1"/>
+            </a:effectRef>
+            <a:fontRef idx="minor">
+              <a:schemeClr val="lt1"/>
+            </a:fontRef>
+          </p:style>
+          <p:txBody>
+            <a:bodyPr rtlCol="0" anchor="ctr"/>
+            <a:lstStyle/>
+            <a:p>
+              <a:pPr algn="ctr"/>
+              <a:endParaRPr lang="en-US"/>
+            </a:p>
+          </p:txBody>
+        </p:sp>
+        <p:pic>
+          <p:nvPicPr>
+            <p:cNvPr id="1028" name="Picture 4" descr="Group Icons | MyDraw">
+              <a:extLst>
+                <a:ext uri="{FF2B5EF4-FFF2-40B4-BE49-F238E27FC236}">
+                  <a16:creationId xmlns:a16="http://schemas.microsoft.com/office/drawing/2014/main" id="{2B19D2F4-A3B9-8DDB-D0DC-EF11A3AA510B}"/>
+                </a:ext>
+              </a:extLst>
+            </p:cNvPr>
+            <p:cNvPicPr>
+              <a:picLocks noChangeAspect="1" noChangeArrowheads="1"/>
+            </p:cNvPicPr>
+            <p:nvPr/>
+          </p:nvPicPr>
+          <p:blipFill>
+            <a:blip r:embed="rId3">
+              <a:extLst>
+                <a:ext uri="{28A0092B-C50C-407E-A947-70E740481C1C}">
+                  <a14:useLocalDpi xmlns:a14="http://schemas.microsoft.com/office/drawing/2010/main" val="0"/>
+                </a:ext>
+              </a:extLst>
+            </a:blip>
+            <a:srcRect/>
+            <a:stretch>
+              <a:fillRect/>
+            </a:stretch>
+          </p:blipFill>
+          <p:spPr bwMode="auto">
+            <a:xfrm>
+              <a:off x="6261124" y="1240770"/>
+              <a:ext cx="324971" cy="243728"/>
+            </a:xfrm>
+            <a:prstGeom prst="rect">
+              <a:avLst/>
+            </a:prstGeom>
+            <a:noFill/>
+            <a:extLst>
+              <a:ext uri="{909E8E84-426E-40DD-AFC4-6F175D3DCCD1}">
+                <a14:hiddenFill xmlns:a14="http://schemas.microsoft.com/office/drawing/2010/main">
+                  <a:solidFill>
+                    <a:srgbClr val="FFFFFF"/>
+                  </a:solidFill>
+                </a14:hiddenFill>
+              </a:ext>
+            </a:extLst>
+          </p:spPr>
+        </p:pic>
+      </p:grpSp>
+      <p:grpSp>
+        <p:nvGrpSpPr>
+          <p:cNvPr id="32" name="Group 31">
+            <a:extLst>
+              <a:ext uri="{FF2B5EF4-FFF2-40B4-BE49-F238E27FC236}">
+                <a16:creationId xmlns:a16="http://schemas.microsoft.com/office/drawing/2014/main" id="{674E3DCE-914B-8BAD-2155-FAADA7127AB9}"/>
+              </a:ext>
+            </a:extLst>
+          </p:cNvPr>
+          <p:cNvGrpSpPr/>
+          <p:nvPr/>
+        </p:nvGrpSpPr>
+        <p:grpSpPr>
+          <a:xfrm>
+            <a:off x="764151" y="2767066"/>
+            <a:ext cx="4722249" cy="1397528"/>
+            <a:chOff x="764151" y="2650523"/>
+            <a:chExt cx="5257173" cy="1397528"/>
+          </a:xfrm>
+          <a:solidFill>
+            <a:srgbClr val="E2E9F6"/>
+          </a:solidFill>
+        </p:grpSpPr>
+        <p:sp>
+          <p:nvSpPr>
+            <p:cNvPr id="19" name="Rectangle 18">
+              <a:extLst>
+                <a:ext uri="{FF2B5EF4-FFF2-40B4-BE49-F238E27FC236}">
+                  <a16:creationId xmlns:a16="http://schemas.microsoft.com/office/drawing/2014/main" id="{407B6E82-0AF6-4451-E0F8-4CF01939475C}"/>
+                </a:ext>
+              </a:extLst>
+            </p:cNvPr>
+            <p:cNvSpPr/>
+            <p:nvPr/>
+          </p:nvSpPr>
+          <p:spPr>
+            <a:xfrm>
+              <a:off x="818075" y="2667484"/>
+              <a:ext cx="5203249" cy="1380567"/>
+            </a:xfrm>
+            <a:prstGeom prst="rect">
+              <a:avLst/>
+            </a:prstGeom>
+            <a:grpFill/>
+            <a:ln>
+              <a:noFill/>
+            </a:ln>
+          </p:spPr>
+          <p:style>
+            <a:lnRef idx="2">
+              <a:schemeClr val="accent1">
+                <a:shade val="15000"/>
+              </a:schemeClr>
+            </a:lnRef>
+            <a:fillRef idx="1">
+              <a:schemeClr val="accent1"/>
+            </a:fillRef>
+            <a:effectRef idx="0">
+              <a:schemeClr val="accent1"/>
+            </a:effectRef>
+            <a:fontRef idx="minor">
+              <a:schemeClr val="lt1"/>
+            </a:fontRef>
+          </p:style>
+          <p:txBody>
+            <a:bodyPr rtlCol="0" anchor="ctr"/>
+            <a:lstStyle/>
+            <a:p>
+              <a:pPr algn="ctr"/>
+              <a:endParaRPr lang="en-US"/>
+            </a:p>
+          </p:txBody>
+        </p:sp>
+        <p:pic>
+          <p:nvPicPr>
+            <p:cNvPr id="1030" name="Picture 6" descr="Group Icons | MyDraw">
+              <a:extLst>
+                <a:ext uri="{FF2B5EF4-FFF2-40B4-BE49-F238E27FC236}">
+                  <a16:creationId xmlns:a16="http://schemas.microsoft.com/office/drawing/2014/main" id="{49B75612-3C6C-1948-29A8-DDFE1DA34C9E}"/>
+                </a:ext>
+              </a:extLst>
+            </p:cNvPr>
+            <p:cNvPicPr>
+              <a:picLocks noChangeAspect="1" noChangeArrowheads="1"/>
+            </p:cNvPicPr>
+            <p:nvPr/>
+          </p:nvPicPr>
+          <p:blipFill>
+            <a:blip r:embed="rId4">
+              <a:extLst>
+                <a:ext uri="{28A0092B-C50C-407E-A947-70E740481C1C}">
+                  <a14:useLocalDpi xmlns:a14="http://schemas.microsoft.com/office/drawing/2010/main" val="0"/>
+                </a:ext>
+              </a:extLst>
+            </a:blip>
+            <a:srcRect/>
+            <a:stretch>
+              <a:fillRect/>
+            </a:stretch>
+          </p:blipFill>
+          <p:spPr bwMode="auto">
+            <a:xfrm>
+              <a:off x="764151" y="2650523"/>
+              <a:ext cx="324971" cy="243729"/>
+            </a:xfrm>
+            <a:prstGeom prst="rect">
+              <a:avLst/>
+            </a:prstGeom>
+            <a:grpFill/>
+            <a:extLst>
+              <a:ext uri="{909E8E84-426E-40DD-AFC4-6F175D3DCCD1}">
+                <a14:hiddenFill xmlns:a14="http://schemas.microsoft.com/office/drawing/2010/main">
+                  <a:solidFill>
+                    <a:srgbClr val="FFFFFF"/>
+                  </a:solidFill>
+                </a14:hiddenFill>
+              </a:ext>
+            </a:extLst>
+          </p:spPr>
+        </p:pic>
+      </p:grpSp>
+      <p:grpSp>
+        <p:nvGrpSpPr>
+          <p:cNvPr id="30" name="Group 29">
+            <a:extLst>
+              <a:ext uri="{FF2B5EF4-FFF2-40B4-BE49-F238E27FC236}">
+                <a16:creationId xmlns:a16="http://schemas.microsoft.com/office/drawing/2014/main" id="{77CF36C6-B752-EF78-8BC7-56F065168613}"/>
+              </a:ext>
+            </a:extLst>
+          </p:cNvPr>
+          <p:cNvGrpSpPr/>
+          <p:nvPr/>
+        </p:nvGrpSpPr>
+        <p:grpSpPr>
+          <a:xfrm>
+            <a:off x="784903" y="1249795"/>
+            <a:ext cx="4701497" cy="1380566"/>
+            <a:chOff x="784903" y="1213935"/>
+            <a:chExt cx="5246796" cy="1380566"/>
+          </a:xfrm>
+        </p:grpSpPr>
+        <p:sp>
+          <p:nvSpPr>
+            <p:cNvPr id="18" name="Rectangle 17">
+              <a:extLst>
+                <a:ext uri="{FF2B5EF4-FFF2-40B4-BE49-F238E27FC236}">
+                  <a16:creationId xmlns:a16="http://schemas.microsoft.com/office/drawing/2014/main" id="{85B5C739-7257-389D-5EAD-9623E04BF72F}"/>
+                </a:ext>
+              </a:extLst>
+            </p:cNvPr>
+            <p:cNvSpPr/>
+            <p:nvPr/>
+          </p:nvSpPr>
+          <p:spPr>
+            <a:xfrm>
+              <a:off x="828450" y="1213935"/>
+              <a:ext cx="5203249" cy="1380566"/>
+            </a:xfrm>
+            <a:prstGeom prst="rect">
+              <a:avLst/>
+            </a:prstGeom>
+            <a:solidFill>
+              <a:srgbClr val="EEF7E9"/>
+            </a:solidFill>
+            <a:ln>
+              <a:noFill/>
+            </a:ln>
+          </p:spPr>
+          <p:style>
+            <a:lnRef idx="2">
+              <a:schemeClr val="accent1">
+                <a:shade val="15000"/>
+              </a:schemeClr>
+            </a:lnRef>
+            <a:fillRef idx="1">
+              <a:schemeClr val="accent1"/>
+            </a:fillRef>
+            <a:effectRef idx="0">
+              <a:schemeClr val="accent1"/>
+            </a:effectRef>
+            <a:fontRef idx="minor">
+              <a:schemeClr val="lt1"/>
+            </a:fontRef>
+          </p:style>
+          <p:txBody>
+            <a:bodyPr rtlCol="0" anchor="ctr"/>
+            <a:lstStyle/>
+            <a:p>
+              <a:pPr algn="ctr"/>
+              <a:endParaRPr lang="en-US" dirty="0"/>
+            </a:p>
+          </p:txBody>
+        </p:sp>
+        <p:pic>
+          <p:nvPicPr>
+            <p:cNvPr id="28" name="Picture 4" descr="Group Icons | MyDraw">
+              <a:extLst>
+                <a:ext uri="{FF2B5EF4-FFF2-40B4-BE49-F238E27FC236}">
+                  <a16:creationId xmlns:a16="http://schemas.microsoft.com/office/drawing/2014/main" id="{A4379B00-D371-FF8C-85B8-F039C0BE0878}"/>
+                </a:ext>
+              </a:extLst>
+            </p:cNvPr>
+            <p:cNvPicPr>
+              <a:picLocks noChangeAspect="1" noChangeArrowheads="1"/>
+            </p:cNvPicPr>
+            <p:nvPr/>
+          </p:nvPicPr>
+          <p:blipFill>
+            <a:blip r:embed="rId3">
+              <a:extLst>
+                <a:ext uri="{28A0092B-C50C-407E-A947-70E740481C1C}">
+                  <a14:useLocalDpi xmlns:a14="http://schemas.microsoft.com/office/drawing/2010/main" val="0"/>
+                </a:ext>
+              </a:extLst>
+            </a:blip>
+            <a:srcRect/>
+            <a:stretch>
+              <a:fillRect/>
+            </a:stretch>
+          </p:blipFill>
+          <p:spPr bwMode="auto">
+            <a:xfrm>
+              <a:off x="784903" y="1219753"/>
+              <a:ext cx="324971" cy="243728"/>
+            </a:xfrm>
+            <a:prstGeom prst="rect">
+              <a:avLst/>
+            </a:prstGeom>
+            <a:noFill/>
+            <a:extLst>
+              <a:ext uri="{909E8E84-426E-40DD-AFC4-6F175D3DCCD1}">
+                <a14:hiddenFill xmlns:a14="http://schemas.microsoft.com/office/drawing/2010/main">
+                  <a:solidFill>
+                    <a:srgbClr val="FFFFFF"/>
+                  </a:solidFill>
+                </a14:hiddenFill>
+              </a:ext>
+            </a:extLst>
+          </p:spPr>
+        </p:pic>
+      </p:grpSp>
+      <p:grpSp>
+        <p:nvGrpSpPr>
+          <p:cNvPr id="33" name="Group 32">
+            <a:extLst>
+              <a:ext uri="{FF2B5EF4-FFF2-40B4-BE49-F238E27FC236}">
+                <a16:creationId xmlns:a16="http://schemas.microsoft.com/office/drawing/2014/main" id="{6514B32F-9817-31A1-B56F-9B03D5AB2E64}"/>
+              </a:ext>
+            </a:extLst>
+          </p:cNvPr>
+          <p:cNvGrpSpPr/>
+          <p:nvPr/>
+        </p:nvGrpSpPr>
+        <p:grpSpPr>
+          <a:xfrm>
+            <a:off x="6705600" y="2741302"/>
+            <a:ext cx="4812697" cy="1397528"/>
+            <a:chOff x="764151" y="2650523"/>
+            <a:chExt cx="5257173" cy="1397528"/>
+          </a:xfrm>
+          <a:solidFill>
+            <a:srgbClr val="E2E9F6"/>
+          </a:solidFill>
+        </p:grpSpPr>
+        <p:sp>
+          <p:nvSpPr>
+            <p:cNvPr id="34" name="Rectangle 33">
+              <a:extLst>
+                <a:ext uri="{FF2B5EF4-FFF2-40B4-BE49-F238E27FC236}">
+                  <a16:creationId xmlns:a16="http://schemas.microsoft.com/office/drawing/2014/main" id="{B389B52B-9A61-9B22-9421-428BE6F67B81}"/>
+                </a:ext>
+              </a:extLst>
+            </p:cNvPr>
+            <p:cNvSpPr/>
+            <p:nvPr/>
+          </p:nvSpPr>
+          <p:spPr>
+            <a:xfrm>
+              <a:off x="818075" y="2667484"/>
+              <a:ext cx="5203249" cy="1380567"/>
+            </a:xfrm>
+            <a:prstGeom prst="rect">
+              <a:avLst/>
+            </a:prstGeom>
+            <a:grpFill/>
+            <a:ln>
+              <a:noFill/>
+            </a:ln>
+          </p:spPr>
+          <p:style>
+            <a:lnRef idx="2">
+              <a:schemeClr val="accent1">
+                <a:shade val="15000"/>
+              </a:schemeClr>
+            </a:lnRef>
+            <a:fillRef idx="1">
+              <a:schemeClr val="accent1"/>
+            </a:fillRef>
+            <a:effectRef idx="0">
+              <a:schemeClr val="accent1"/>
+            </a:effectRef>
+            <a:fontRef idx="minor">
+              <a:schemeClr val="lt1"/>
+            </a:fontRef>
+          </p:style>
+          <p:txBody>
+            <a:bodyPr rtlCol="0" anchor="ctr"/>
+            <a:lstStyle/>
+            <a:p>
+              <a:pPr algn="ctr"/>
+              <a:endParaRPr lang="en-US"/>
+            </a:p>
+          </p:txBody>
+        </p:sp>
+        <p:pic>
+          <p:nvPicPr>
+            <p:cNvPr id="35" name="Picture 6" descr="Group Icons | MyDraw">
+              <a:extLst>
+                <a:ext uri="{FF2B5EF4-FFF2-40B4-BE49-F238E27FC236}">
+                  <a16:creationId xmlns:a16="http://schemas.microsoft.com/office/drawing/2014/main" id="{31C50633-7868-696D-8266-E1BF63FB85B7}"/>
+                </a:ext>
+              </a:extLst>
+            </p:cNvPr>
+            <p:cNvPicPr>
+              <a:picLocks noChangeAspect="1" noChangeArrowheads="1"/>
+            </p:cNvPicPr>
+            <p:nvPr/>
+          </p:nvPicPr>
+          <p:blipFill>
+            <a:blip r:embed="rId4">
+              <a:extLst>
+                <a:ext uri="{28A0092B-C50C-407E-A947-70E740481C1C}">
+                  <a14:useLocalDpi xmlns:a14="http://schemas.microsoft.com/office/drawing/2010/main" val="0"/>
+                </a:ext>
+              </a:extLst>
+            </a:blip>
+            <a:srcRect/>
+            <a:stretch>
+              <a:fillRect/>
+            </a:stretch>
+          </p:blipFill>
+          <p:spPr bwMode="auto">
+            <a:xfrm>
+              <a:off x="764151" y="2650523"/>
+              <a:ext cx="324971" cy="243729"/>
+            </a:xfrm>
+            <a:prstGeom prst="rect">
+              <a:avLst/>
+            </a:prstGeom>
+            <a:grpFill/>
+            <a:extLst>
+              <a:ext uri="{909E8E84-426E-40DD-AFC4-6F175D3DCCD1}">
+                <a14:hiddenFill xmlns:a14="http://schemas.microsoft.com/office/drawing/2010/main">
+                  <a:solidFill>
+                    <a:srgbClr val="FFFFFF"/>
+                  </a:solidFill>
+                </a14:hiddenFill>
+              </a:ext>
+            </a:extLst>
+          </p:spPr>
+        </p:pic>
+      </p:grpSp>
+      <p:grpSp>
+        <p:nvGrpSpPr>
+          <p:cNvPr id="36" name="Group 35">
+            <a:extLst>
+              <a:ext uri="{FF2B5EF4-FFF2-40B4-BE49-F238E27FC236}">
+                <a16:creationId xmlns:a16="http://schemas.microsoft.com/office/drawing/2014/main" id="{A6E0953E-180C-91DB-B2E9-FCA40E7292A2}"/>
+              </a:ext>
+            </a:extLst>
+          </p:cNvPr>
+          <p:cNvGrpSpPr/>
+          <p:nvPr/>
+        </p:nvGrpSpPr>
+        <p:grpSpPr>
+          <a:xfrm>
+            <a:off x="764151" y="4423062"/>
+            <a:ext cx="4722249" cy="1397528"/>
+            <a:chOff x="764151" y="2650523"/>
+            <a:chExt cx="5257173" cy="1397528"/>
+          </a:xfrm>
+          <a:solidFill>
+            <a:srgbClr val="E2E9F6"/>
+          </a:solidFill>
+        </p:grpSpPr>
+        <p:sp>
+          <p:nvSpPr>
+            <p:cNvPr id="37" name="Rectangle 36">
+              <a:extLst>
+                <a:ext uri="{FF2B5EF4-FFF2-40B4-BE49-F238E27FC236}">
+                  <a16:creationId xmlns:a16="http://schemas.microsoft.com/office/drawing/2014/main" id="{2BE164DE-4622-43E1-5EF3-B94F677FB079}"/>
+                </a:ext>
+              </a:extLst>
+            </p:cNvPr>
+            <p:cNvSpPr/>
+            <p:nvPr/>
+          </p:nvSpPr>
+          <p:spPr>
+            <a:xfrm>
+              <a:off x="818075" y="2667484"/>
+              <a:ext cx="5203249" cy="1380567"/>
+            </a:xfrm>
+            <a:prstGeom prst="rect">
+              <a:avLst/>
+            </a:prstGeom>
+            <a:grpFill/>
+            <a:ln>
+              <a:noFill/>
+            </a:ln>
+          </p:spPr>
+          <p:style>
+            <a:lnRef idx="2">
+              <a:schemeClr val="accent1">
+                <a:shade val="15000"/>
+              </a:schemeClr>
+            </a:lnRef>
+            <a:fillRef idx="1">
+              <a:schemeClr val="accent1"/>
+            </a:fillRef>
+            <a:effectRef idx="0">
+              <a:schemeClr val="accent1"/>
+            </a:effectRef>
+            <a:fontRef idx="minor">
+              <a:schemeClr val="lt1"/>
+            </a:fontRef>
+          </p:style>
+          <p:txBody>
+            <a:bodyPr rtlCol="0" anchor="ctr"/>
+            <a:lstStyle/>
+            <a:p>
+              <a:pPr algn="ctr"/>
+              <a:endParaRPr lang="en-US"/>
+            </a:p>
+          </p:txBody>
+        </p:sp>
+        <p:pic>
+          <p:nvPicPr>
+            <p:cNvPr id="38" name="Picture 6" descr="Group Icons | MyDraw">
+              <a:extLst>
+                <a:ext uri="{FF2B5EF4-FFF2-40B4-BE49-F238E27FC236}">
+                  <a16:creationId xmlns:a16="http://schemas.microsoft.com/office/drawing/2014/main" id="{D1F21B6A-EF6B-7ADF-A967-4EC6FE723293}"/>
+                </a:ext>
+              </a:extLst>
+            </p:cNvPr>
+            <p:cNvPicPr>
+              <a:picLocks noChangeAspect="1" noChangeArrowheads="1"/>
+            </p:cNvPicPr>
+            <p:nvPr/>
+          </p:nvPicPr>
+          <p:blipFill>
+            <a:blip r:embed="rId4">
+              <a:extLst>
+                <a:ext uri="{28A0092B-C50C-407E-A947-70E740481C1C}">
+                  <a14:useLocalDpi xmlns:a14="http://schemas.microsoft.com/office/drawing/2010/main" val="0"/>
+                </a:ext>
+              </a:extLst>
+            </a:blip>
+            <a:srcRect/>
+            <a:stretch>
+              <a:fillRect/>
+            </a:stretch>
+          </p:blipFill>
+          <p:spPr bwMode="auto">
+            <a:xfrm>
+              <a:off x="764151" y="2650523"/>
+              <a:ext cx="324971" cy="243729"/>
+            </a:xfrm>
+            <a:prstGeom prst="rect">
+              <a:avLst/>
+            </a:prstGeom>
+            <a:grpFill/>
+            <a:extLst>
+              <a:ext uri="{909E8E84-426E-40DD-AFC4-6F175D3DCCD1}">
+                <a14:hiddenFill xmlns:a14="http://schemas.microsoft.com/office/drawing/2010/main">
+                  <a:solidFill>
+                    <a:srgbClr val="FFFFFF"/>
+                  </a:solidFill>
+                </a14:hiddenFill>
+              </a:ext>
+            </a:extLst>
+          </p:spPr>
+        </p:pic>
+      </p:grpSp>
+      <p:grpSp>
+        <p:nvGrpSpPr>
+          <p:cNvPr id="39" name="Group 38">
+            <a:extLst>
+              <a:ext uri="{FF2B5EF4-FFF2-40B4-BE49-F238E27FC236}">
+                <a16:creationId xmlns:a16="http://schemas.microsoft.com/office/drawing/2014/main" id="{88038915-D8B8-B0E8-F339-F4C85F8CBBB7}"/>
+              </a:ext>
+            </a:extLst>
+          </p:cNvPr>
+          <p:cNvGrpSpPr/>
+          <p:nvPr/>
+        </p:nvGrpSpPr>
+        <p:grpSpPr>
+          <a:xfrm>
+            <a:off x="6705600" y="4419241"/>
+            <a:ext cx="4832492" cy="1397528"/>
+            <a:chOff x="764151" y="2650523"/>
+            <a:chExt cx="5257173" cy="1397528"/>
+          </a:xfrm>
+          <a:solidFill>
+            <a:srgbClr val="E2E9F6"/>
+          </a:solidFill>
+        </p:grpSpPr>
+        <p:sp>
+          <p:nvSpPr>
+            <p:cNvPr id="40" name="Rectangle 39">
+              <a:extLst>
+                <a:ext uri="{FF2B5EF4-FFF2-40B4-BE49-F238E27FC236}">
+                  <a16:creationId xmlns:a16="http://schemas.microsoft.com/office/drawing/2014/main" id="{825070A5-6765-1396-F458-6CF16FB366E1}"/>
+                </a:ext>
+              </a:extLst>
+            </p:cNvPr>
+            <p:cNvSpPr/>
+            <p:nvPr/>
+          </p:nvSpPr>
+          <p:spPr>
+            <a:xfrm>
+              <a:off x="818075" y="2667484"/>
+              <a:ext cx="5203249" cy="1380567"/>
+            </a:xfrm>
+            <a:prstGeom prst="rect">
+              <a:avLst/>
+            </a:prstGeom>
+            <a:grpFill/>
+            <a:ln>
+              <a:noFill/>
+            </a:ln>
+          </p:spPr>
+          <p:style>
+            <a:lnRef idx="2">
+              <a:schemeClr val="accent1">
+                <a:shade val="15000"/>
+              </a:schemeClr>
+            </a:lnRef>
+            <a:fillRef idx="1">
+              <a:schemeClr val="accent1"/>
+            </a:fillRef>
+            <a:effectRef idx="0">
+              <a:schemeClr val="accent1"/>
+            </a:effectRef>
+            <a:fontRef idx="minor">
+              <a:schemeClr val="lt1"/>
+            </a:fontRef>
+          </p:style>
+          <p:txBody>
+            <a:bodyPr rtlCol="0" anchor="ctr"/>
+            <a:lstStyle/>
+            <a:p>
+              <a:pPr algn="ctr"/>
+              <a:endParaRPr lang="en-US"/>
+            </a:p>
+          </p:txBody>
+        </p:sp>
+        <p:pic>
+          <p:nvPicPr>
+            <p:cNvPr id="41" name="Picture 6" descr="Group Icons | MyDraw">
+              <a:extLst>
+                <a:ext uri="{FF2B5EF4-FFF2-40B4-BE49-F238E27FC236}">
+                  <a16:creationId xmlns:a16="http://schemas.microsoft.com/office/drawing/2014/main" id="{DA9E9756-C8B5-05B9-8636-E320FC9817B6}"/>
+                </a:ext>
+              </a:extLst>
+            </p:cNvPr>
+            <p:cNvPicPr>
+              <a:picLocks noChangeAspect="1" noChangeArrowheads="1"/>
+            </p:cNvPicPr>
+            <p:nvPr/>
+          </p:nvPicPr>
+          <p:blipFill>
+            <a:blip r:embed="rId4">
+              <a:extLst>
+                <a:ext uri="{28A0092B-C50C-407E-A947-70E740481C1C}">
+                  <a14:useLocalDpi xmlns:a14="http://schemas.microsoft.com/office/drawing/2010/main" val="0"/>
+                </a:ext>
+              </a:extLst>
+            </a:blip>
+            <a:srcRect/>
+            <a:stretch>
+              <a:fillRect/>
+            </a:stretch>
+          </p:blipFill>
+          <p:spPr bwMode="auto">
+            <a:xfrm>
+              <a:off x="764151" y="2650523"/>
+              <a:ext cx="324971" cy="243729"/>
+            </a:xfrm>
+            <a:prstGeom prst="rect">
+              <a:avLst/>
+            </a:prstGeom>
+            <a:grpFill/>
+            <a:extLst>
+              <a:ext uri="{909E8E84-426E-40DD-AFC4-6F175D3DCCD1}">
+                <a14:hiddenFill xmlns:a14="http://schemas.microsoft.com/office/drawing/2010/main">
+                  <a:solidFill>
+                    <a:srgbClr val="FFFFFF"/>
+                  </a:solidFill>
+                </a14:hiddenFill>
+              </a:ext>
+            </a:extLst>
+          </p:spPr>
+        </p:pic>
+      </p:grpSp>
+      <p:pic>
+        <p:nvPicPr>
+          <p:cNvPr id="1034" name="Picture 10" descr="Copy, database, rds icon - Free download on Iconfinder">
+            <a:extLst>
+              <a:ext uri="{FF2B5EF4-FFF2-40B4-BE49-F238E27FC236}">
+                <a16:creationId xmlns:a16="http://schemas.microsoft.com/office/drawing/2014/main" id="{7BD9F47F-1262-D6A3-6638-4318F040EA1B}"/>
+              </a:ext>
+            </a:extLst>
+          </p:cNvPr>
+          <p:cNvPicPr>
+            <a:picLocks noChangeAspect="1" noChangeArrowheads="1"/>
+          </p:cNvPicPr>
+          <p:nvPr/>
+        </p:nvPicPr>
+        <p:blipFill>
+          <a:blip r:embed="rId5">
+            <a:extLst>
+              <a:ext uri="{28A0092B-C50C-407E-A947-70E740481C1C}">
+                <a14:useLocalDpi xmlns:a14="http://schemas.microsoft.com/office/drawing/2010/main" val="0"/>
+              </a:ext>
+            </a:extLst>
+          </a:blip>
+          <a:srcRect/>
+          <a:stretch>
+            <a:fillRect/>
+          </a:stretch>
+        </p:blipFill>
+        <p:spPr bwMode="auto">
+          <a:xfrm>
+            <a:off x="2722309" y="4743945"/>
+            <a:ext cx="648419" cy="648419"/>
+          </a:xfrm>
+          <a:prstGeom prst="rect">
+            <a:avLst/>
+          </a:prstGeom>
+          <a:noFill/>
+          <a:extLst>
+            <a:ext uri="{909E8E84-426E-40DD-AFC4-6F175D3DCCD1}">
+              <a14:hiddenFill xmlns:a14="http://schemas.microsoft.com/office/drawing/2010/main">
+                <a:solidFill>
+                  <a:srgbClr val="FFFFFF"/>
+                </a:solidFill>
+              </a14:hiddenFill>
+            </a:ext>
+          </a:extLst>
+        </p:spPr>
+      </p:pic>
+      <p:pic>
+        <p:nvPicPr>
+          <p:cNvPr id="42" name="Picture 10" descr="Copy, database, rds icon - Free download on Iconfinder">
+            <a:extLst>
+              <a:ext uri="{FF2B5EF4-FFF2-40B4-BE49-F238E27FC236}">
+                <a16:creationId xmlns:a16="http://schemas.microsoft.com/office/drawing/2014/main" id="{FE4569E9-A086-59A7-6C00-6B85397E51BD}"/>
+              </a:ext>
+            </a:extLst>
+          </p:cNvPr>
+          <p:cNvPicPr>
+            <a:picLocks noChangeAspect="1" noChangeArrowheads="1"/>
+          </p:cNvPicPr>
+          <p:nvPr/>
+        </p:nvPicPr>
+        <p:blipFill>
+          <a:blip r:embed="rId5">
+            <a:duotone>
+              <a:schemeClr val="accent5">
+                <a:shade val="45000"/>
+                <a:satMod val="135000"/>
+              </a:schemeClr>
+              <a:prstClr val="white"/>
+            </a:duotone>
+            <a:extLst>
+              <a:ext uri="{28A0092B-C50C-407E-A947-70E740481C1C}">
+                <a14:useLocalDpi xmlns:a14="http://schemas.microsoft.com/office/drawing/2010/main" val="0"/>
+              </a:ext>
+            </a:extLst>
+          </a:blip>
+          <a:srcRect/>
+          <a:stretch>
+            <a:fillRect/>
+          </a:stretch>
+        </p:blipFill>
+        <p:spPr bwMode="auto">
+          <a:xfrm>
+            <a:off x="8812421" y="4743945"/>
+            <a:ext cx="648419" cy="648419"/>
+          </a:xfrm>
+          <a:prstGeom prst="rect">
+            <a:avLst/>
+          </a:prstGeom>
+          <a:noFill/>
+          <a:extLst>
+            <a:ext uri="{909E8E84-426E-40DD-AFC4-6F175D3DCCD1}">
+              <a14:hiddenFill xmlns:a14="http://schemas.microsoft.com/office/drawing/2010/main">
+                <a:solidFill>
+                  <a:srgbClr val="FFFFFF"/>
+                </a:solidFill>
+              </a14:hiddenFill>
+            </a:ext>
+          </a:extLst>
+        </p:spPr>
+      </p:pic>
+      <p:sp>
+        <p:nvSpPr>
+          <p:cNvPr id="43" name="TextBox 42">
+            <a:extLst>
+              <a:ext uri="{FF2B5EF4-FFF2-40B4-BE49-F238E27FC236}">
+                <a16:creationId xmlns:a16="http://schemas.microsoft.com/office/drawing/2014/main" id="{8EA9147E-FD1A-DC13-CD90-210D04D39635}"/>
+              </a:ext>
+            </a:extLst>
+          </p:cNvPr>
+          <p:cNvSpPr txBox="1"/>
+          <p:nvPr/>
+        </p:nvSpPr>
+        <p:spPr>
+          <a:xfrm>
+            <a:off x="2368483" y="5297723"/>
+            <a:ext cx="1370888" cy="246221"/>
+          </a:xfrm>
+          <a:prstGeom prst="rect">
+            <a:avLst/>
+          </a:prstGeom>
+          <a:noFill/>
+        </p:spPr>
+        <p:txBody>
+          <a:bodyPr wrap="none" rtlCol="0">
+            <a:spAutoFit/>
+          </a:bodyPr>
+          <a:lstStyle/>
+          <a:p>
+            <a:pPr algn="ctr"/>
+            <a:r>
+              <a:rPr lang="en-US" sz="1000" dirty="0"/>
+              <a:t>RDS Instance (Primary)</a:t>
+            </a:r>
+          </a:p>
+        </p:txBody>
+      </p:sp>
+      <p:sp>
+        <p:nvSpPr>
+          <p:cNvPr id="44" name="TextBox 43">
+            <a:extLst>
+              <a:ext uri="{FF2B5EF4-FFF2-40B4-BE49-F238E27FC236}">
+                <a16:creationId xmlns:a16="http://schemas.microsoft.com/office/drawing/2014/main" id="{F6795310-B2C0-FA06-2C54-F2CB2CD3CF42}"/>
+              </a:ext>
+            </a:extLst>
+          </p:cNvPr>
+          <p:cNvSpPr txBox="1"/>
+          <p:nvPr/>
+        </p:nvSpPr>
+        <p:spPr>
+          <a:xfrm>
+            <a:off x="8410148" y="5297722"/>
+            <a:ext cx="1508746" cy="246221"/>
+          </a:xfrm>
+          <a:prstGeom prst="rect">
+            <a:avLst/>
+          </a:prstGeom>
+          <a:noFill/>
+        </p:spPr>
+        <p:txBody>
+          <a:bodyPr wrap="none" rtlCol="0">
+            <a:spAutoFit/>
+          </a:bodyPr>
+          <a:lstStyle/>
+          <a:p>
+            <a:pPr algn="ctr"/>
+            <a:r>
+              <a:rPr lang="en-US" sz="1000" dirty="0"/>
+              <a:t>RDS Instance (Secondary)</a:t>
+            </a:r>
+          </a:p>
+        </p:txBody>
+      </p:sp>
+      <p:cxnSp>
+        <p:nvCxnSpPr>
+          <p:cNvPr id="46" name="Straight Arrow Connector 45">
+            <a:extLst>
+              <a:ext uri="{FF2B5EF4-FFF2-40B4-BE49-F238E27FC236}">
+                <a16:creationId xmlns:a16="http://schemas.microsoft.com/office/drawing/2014/main" id="{8E83F885-7F9F-0A69-7D4F-9964E6FB6F58}"/>
+              </a:ext>
+            </a:extLst>
+          </p:cNvPr>
+          <p:cNvCxnSpPr>
+            <a:stCxn id="1034" idx="3"/>
+            <a:endCxn id="42" idx="1"/>
+          </p:cNvCxnSpPr>
+          <p:nvPr/>
+        </p:nvCxnSpPr>
+        <p:spPr>
+          <a:xfrm>
+            <a:off x="3370728" y="5068155"/>
+            <a:ext cx="5441693" cy="0"/>
+          </a:xfrm>
+          <a:prstGeom prst="straightConnector1">
+            <a:avLst/>
+          </a:prstGeom>
+          <a:ln w="3175">
+            <a:prstDash val="dash"/>
+            <a:headEnd type="triangle"/>
+            <a:tailEnd type="triangle"/>
+          </a:ln>
+        </p:spPr>
+        <p:style>
+          <a:lnRef idx="1">
+            <a:schemeClr val="accent3"/>
+          </a:lnRef>
+          <a:fillRef idx="0">
+            <a:schemeClr val="accent3"/>
+          </a:fillRef>
+          <a:effectRef idx="0">
+            <a:schemeClr val="accent3"/>
+          </a:effectRef>
+          <a:fontRef idx="minor">
+            <a:schemeClr val="tx1"/>
+          </a:fontRef>
+        </p:style>
+      </p:cxnSp>
+      <p:pic>
+        <p:nvPicPr>
+          <p:cNvPr id="1038" name="Picture 14" descr="How to Change or Upgrade an EC2 Instance Type | Logicata">
+            <a:extLst>
+              <a:ext uri="{FF2B5EF4-FFF2-40B4-BE49-F238E27FC236}">
+                <a16:creationId xmlns:a16="http://schemas.microsoft.com/office/drawing/2014/main" id="{1C24193B-FF64-FD73-153E-B52A840BC80B}"/>
+              </a:ext>
+            </a:extLst>
+          </p:cNvPr>
+          <p:cNvPicPr>
+            <a:picLocks noChangeAspect="1" noChangeArrowheads="1"/>
+          </p:cNvPicPr>
+          <p:nvPr/>
+        </p:nvPicPr>
+        <p:blipFill>
+          <a:blip r:embed="rId6">
+            <a:extLst>
+              <a:ext uri="{28A0092B-C50C-407E-A947-70E740481C1C}">
+                <a14:useLocalDpi xmlns:a14="http://schemas.microsoft.com/office/drawing/2010/main" val="0"/>
+              </a:ext>
+            </a:extLst>
+          </a:blip>
+          <a:srcRect/>
+          <a:stretch>
+            <a:fillRect/>
+          </a:stretch>
+        </p:blipFill>
+        <p:spPr bwMode="auto">
+          <a:xfrm>
+            <a:off x="2775503" y="3213550"/>
+            <a:ext cx="542029" cy="542029"/>
+          </a:xfrm>
+          <a:prstGeom prst="rect">
+            <a:avLst/>
+          </a:prstGeom>
+          <a:noFill/>
+          <a:extLst>
+            <a:ext uri="{909E8E84-426E-40DD-AFC4-6F175D3DCCD1}">
+              <a14:hiddenFill xmlns:a14="http://schemas.microsoft.com/office/drawing/2010/main">
+                <a:solidFill>
+                  <a:srgbClr val="FFFFFF"/>
+                </a:solidFill>
+              </a14:hiddenFill>
+            </a:ext>
+          </a:extLst>
+        </p:spPr>
+      </p:pic>
+      <p:pic>
+        <p:nvPicPr>
+          <p:cNvPr id="47" name="Picture 14" descr="How to Change or Upgrade an EC2 Instance Type | Logicata">
+            <a:extLst>
+              <a:ext uri="{FF2B5EF4-FFF2-40B4-BE49-F238E27FC236}">
+                <a16:creationId xmlns:a16="http://schemas.microsoft.com/office/drawing/2014/main" id="{1B400CCB-F24C-45EC-DFE5-4DE801C7FDFB}"/>
+              </a:ext>
+            </a:extLst>
+          </p:cNvPr>
+          <p:cNvPicPr>
+            <a:picLocks noChangeAspect="1" noChangeArrowheads="1"/>
+          </p:cNvPicPr>
+          <p:nvPr/>
+        </p:nvPicPr>
+        <p:blipFill>
+          <a:blip r:embed="rId6">
+            <a:extLst>
+              <a:ext uri="{28A0092B-C50C-407E-A947-70E740481C1C}">
+                <a14:useLocalDpi xmlns:a14="http://schemas.microsoft.com/office/drawing/2010/main" val="0"/>
+              </a:ext>
+            </a:extLst>
+          </a:blip>
+          <a:srcRect/>
+          <a:stretch>
+            <a:fillRect/>
+          </a:stretch>
+        </p:blipFill>
+        <p:spPr bwMode="auto">
+          <a:xfrm>
+            <a:off x="8875615" y="3213550"/>
+            <a:ext cx="542029" cy="542029"/>
+          </a:xfrm>
+          <a:prstGeom prst="rect">
+            <a:avLst/>
+          </a:prstGeom>
+          <a:noFill/>
+          <a:extLst>
+            <a:ext uri="{909E8E84-426E-40DD-AFC4-6F175D3DCCD1}">
+              <a14:hiddenFill xmlns:a14="http://schemas.microsoft.com/office/drawing/2010/main">
+                <a:solidFill>
+                  <a:srgbClr val="FFFFFF"/>
+                </a:solidFill>
+              </a14:hiddenFill>
+            </a:ext>
+          </a:extLst>
+        </p:spPr>
+      </p:pic>
+      <p:pic>
+        <p:nvPicPr>
+          <p:cNvPr id="1040" name="Picture 16">
+            <a:extLst>
+              <a:ext uri="{FF2B5EF4-FFF2-40B4-BE49-F238E27FC236}">
+                <a16:creationId xmlns:a16="http://schemas.microsoft.com/office/drawing/2014/main" id="{8D9760CE-4CBE-6E0C-23B6-0B4B539F4087}"/>
+              </a:ext>
+            </a:extLst>
+          </p:cNvPr>
+          <p:cNvPicPr>
+            <a:picLocks noChangeAspect="1" noChangeArrowheads="1"/>
+          </p:cNvPicPr>
+          <p:nvPr/>
+        </p:nvPicPr>
+        <p:blipFill>
+          <a:blip r:embed="rId7">
+            <a:extLst>
+              <a:ext uri="{28A0092B-C50C-407E-A947-70E740481C1C}">
+                <a14:useLocalDpi xmlns:a14="http://schemas.microsoft.com/office/drawing/2010/main" val="0"/>
+              </a:ext>
+            </a:extLst>
+          </a:blip>
+          <a:srcRect/>
+          <a:stretch>
+            <a:fillRect/>
+          </a:stretch>
+        </p:blipFill>
+        <p:spPr bwMode="auto">
+          <a:xfrm>
+            <a:off x="5822635" y="3163416"/>
+            <a:ext cx="642296" cy="642296"/>
+          </a:xfrm>
+          <a:prstGeom prst="rect">
+            <a:avLst/>
+          </a:prstGeom>
+          <a:noFill/>
+          <a:extLst>
+            <a:ext uri="{909E8E84-426E-40DD-AFC4-6F175D3DCCD1}">
+              <a14:hiddenFill xmlns:a14="http://schemas.microsoft.com/office/drawing/2010/main">
+                <a:solidFill>
+                  <a:srgbClr val="FFFFFF"/>
+                </a:solidFill>
+              </a14:hiddenFill>
+            </a:ext>
+          </a:extLst>
+        </p:spPr>
+      </p:pic>
+      <p:cxnSp>
+        <p:nvCxnSpPr>
+          <p:cNvPr id="49" name="Straight Arrow Connector 48">
+            <a:extLst>
+              <a:ext uri="{FF2B5EF4-FFF2-40B4-BE49-F238E27FC236}">
+                <a16:creationId xmlns:a16="http://schemas.microsoft.com/office/drawing/2014/main" id="{EF684C5D-3805-A695-616A-9CAEA0E7B4A3}"/>
+              </a:ext>
+            </a:extLst>
+          </p:cNvPr>
+          <p:cNvCxnSpPr>
+            <a:stCxn id="1040" idx="1"/>
+            <a:endCxn id="1038" idx="3"/>
+          </p:cNvCxnSpPr>
+          <p:nvPr/>
+        </p:nvCxnSpPr>
+        <p:spPr>
+          <a:xfrm flipH="1">
+            <a:off x="3317532" y="3484564"/>
+            <a:ext cx="2505103" cy="1"/>
+          </a:xfrm>
+          <a:prstGeom prst="straightConnector1">
+            <a:avLst/>
+          </a:prstGeom>
+          <a:ln>
+            <a:tailEnd type="triangle"/>
+          </a:ln>
+        </p:spPr>
+        <p:style>
+          <a:lnRef idx="1">
+            <a:schemeClr val="accent3"/>
+          </a:lnRef>
+          <a:fillRef idx="0">
+            <a:schemeClr val="accent3"/>
+          </a:fillRef>
+          <a:effectRef idx="0">
+            <a:schemeClr val="accent3"/>
+          </a:effectRef>
+          <a:fontRef idx="minor">
+            <a:schemeClr val="tx1"/>
+          </a:fontRef>
+        </p:style>
+      </p:cxnSp>
+      <p:cxnSp>
+        <p:nvCxnSpPr>
+          <p:cNvPr id="52" name="Straight Arrow Connector 51">
+            <a:extLst>
+              <a:ext uri="{FF2B5EF4-FFF2-40B4-BE49-F238E27FC236}">
+                <a16:creationId xmlns:a16="http://schemas.microsoft.com/office/drawing/2014/main" id="{3C6C7BF0-C471-8DB1-6470-04D97775B7CE}"/>
+              </a:ext>
+            </a:extLst>
+          </p:cNvPr>
+          <p:cNvCxnSpPr>
+            <a:stCxn id="1040" idx="3"/>
+            <a:endCxn id="47" idx="1"/>
+          </p:cNvCxnSpPr>
+          <p:nvPr/>
+        </p:nvCxnSpPr>
+        <p:spPr>
+          <a:xfrm>
+            <a:off x="6464931" y="3484564"/>
+            <a:ext cx="2410684" cy="1"/>
+          </a:xfrm>
+          <a:prstGeom prst="straightConnector1">
+            <a:avLst/>
+          </a:prstGeom>
+          <a:ln>
+            <a:tailEnd type="triangle"/>
+          </a:ln>
+        </p:spPr>
+        <p:style>
+          <a:lnRef idx="1">
+            <a:schemeClr val="accent3"/>
+          </a:lnRef>
+          <a:fillRef idx="0">
+            <a:schemeClr val="accent3"/>
+          </a:fillRef>
+          <a:effectRef idx="0">
+            <a:schemeClr val="accent3"/>
+          </a:effectRef>
+          <a:fontRef idx="minor">
+            <a:schemeClr val="tx1"/>
+          </a:fontRef>
+        </p:style>
+      </p:cxnSp>
+    </p:spTree>
+    <p:extLst>
+      <p:ext uri="{BB962C8B-B14F-4D97-AF65-F5344CB8AC3E}">
+        <p14:creationId xmlns:p14="http://schemas.microsoft.com/office/powerpoint/2010/main" val="2282690674"/>
+      </p:ext>
+    </p:extLst>
+  </p:cSld>
+  <p:clrMapOvr>
+    <a:masterClrMapping/>
+  </p:clrMapOvr>
+</p:sld>
+</file>
+
 <file path=ppt/theme/theme1.xml><?xml version="1.0" encoding="utf-8"?>
 <a:theme xmlns:a="http://schemas.openxmlformats.org/drawingml/2006/main" name="Office Theme">
   <a:themeElements>

</xml_diff>